<commit_message>
Final changes for presentation.
</commit_message>
<xml_diff>
--- a/GraphQL.NET.pptx
+++ b/GraphQL.NET.pptx
@@ -6684,8 +6684,12 @@
           <a:lstStyle/>
           <a:p>
             <a:r>
+              <a:rPr lang="en-US" dirty="0" err="1"/>
+              <a:t>GraphQL</a:t>
+            </a:r>
+            <a:r>
               <a:rPr lang="en-US" dirty="0"/>
-              <a:t>Pubs and GraphQL.NET</a:t>
+              <a:t> and GraphQL.NET</a:t>
             </a:r>
           </a:p>
         </p:txBody>

</xml_diff>